<commit_message>
Split out EventHub types into separate file. Made naming consistent to talk about "Monthly / Annually" everywhere.
</commit_message>
<xml_diff>
--- a/docs/images.pptx
+++ b/docs/images.pptx
@@ -266,7 +266,7 @@
           <a:p>
             <a:fld id="{E43E6874-846B-4036-8D9A-9072E9C8BA6D}" type="datetimeFigureOut">
               <a:rPr lang="LID4096" smtClean="0"/>
-              <a:t>10/12/2021</a:t>
+              <a:t>10/15/2021</a:t>
             </a:fld>
             <a:endParaRPr lang="LID4096"/>
           </a:p>
@@ -466,7 +466,7 @@
           <a:p>
             <a:fld id="{E43E6874-846B-4036-8D9A-9072E9C8BA6D}" type="datetimeFigureOut">
               <a:rPr lang="LID4096" smtClean="0"/>
-              <a:t>10/12/2021</a:t>
+              <a:t>10/15/2021</a:t>
             </a:fld>
             <a:endParaRPr lang="LID4096"/>
           </a:p>
@@ -676,7 +676,7 @@
           <a:p>
             <a:fld id="{E43E6874-846B-4036-8D9A-9072E9C8BA6D}" type="datetimeFigureOut">
               <a:rPr lang="LID4096" smtClean="0"/>
-              <a:t>10/12/2021</a:t>
+              <a:t>10/15/2021</a:t>
             </a:fld>
             <a:endParaRPr lang="LID4096"/>
           </a:p>
@@ -876,7 +876,7 @@
           <a:p>
             <a:fld id="{E43E6874-846B-4036-8D9A-9072E9C8BA6D}" type="datetimeFigureOut">
               <a:rPr lang="LID4096" smtClean="0"/>
-              <a:t>10/12/2021</a:t>
+              <a:t>10/15/2021</a:t>
             </a:fld>
             <a:endParaRPr lang="LID4096"/>
           </a:p>
@@ -1152,7 +1152,7 @@
           <a:p>
             <a:fld id="{E43E6874-846B-4036-8D9A-9072E9C8BA6D}" type="datetimeFigureOut">
               <a:rPr lang="LID4096" smtClean="0"/>
-              <a:t>10/12/2021</a:t>
+              <a:t>10/15/2021</a:t>
             </a:fld>
             <a:endParaRPr lang="LID4096"/>
           </a:p>
@@ -1420,7 +1420,7 @@
           <a:p>
             <a:fld id="{E43E6874-846B-4036-8D9A-9072E9C8BA6D}" type="datetimeFigureOut">
               <a:rPr lang="LID4096" smtClean="0"/>
-              <a:t>10/12/2021</a:t>
+              <a:t>10/15/2021</a:t>
             </a:fld>
             <a:endParaRPr lang="LID4096"/>
           </a:p>
@@ -1835,7 +1835,7 @@
           <a:p>
             <a:fld id="{E43E6874-846B-4036-8D9A-9072E9C8BA6D}" type="datetimeFigureOut">
               <a:rPr lang="LID4096" smtClean="0"/>
-              <a:t>10/12/2021</a:t>
+              <a:t>10/15/2021</a:t>
             </a:fld>
             <a:endParaRPr lang="LID4096"/>
           </a:p>
@@ -1977,7 +1977,7 @@
           <a:p>
             <a:fld id="{E43E6874-846B-4036-8D9A-9072E9C8BA6D}" type="datetimeFigureOut">
               <a:rPr lang="LID4096" smtClean="0"/>
-              <a:t>10/12/2021</a:t>
+              <a:t>10/15/2021</a:t>
             </a:fld>
             <a:endParaRPr lang="LID4096"/>
           </a:p>
@@ -2090,7 +2090,7 @@
           <a:p>
             <a:fld id="{E43E6874-846B-4036-8D9A-9072E9C8BA6D}" type="datetimeFigureOut">
               <a:rPr lang="LID4096" smtClean="0"/>
-              <a:t>10/12/2021</a:t>
+              <a:t>10/15/2021</a:t>
             </a:fld>
             <a:endParaRPr lang="LID4096"/>
           </a:p>
@@ -2403,7 +2403,7 @@
           <a:p>
             <a:fld id="{E43E6874-846B-4036-8D9A-9072E9C8BA6D}" type="datetimeFigureOut">
               <a:rPr lang="LID4096" smtClean="0"/>
-              <a:t>10/12/2021</a:t>
+              <a:t>10/15/2021</a:t>
             </a:fld>
             <a:endParaRPr lang="LID4096"/>
           </a:p>
@@ -2692,7 +2692,7 @@
           <a:p>
             <a:fld id="{E43E6874-846B-4036-8D9A-9072E9C8BA6D}" type="datetimeFigureOut">
               <a:rPr lang="LID4096" smtClean="0"/>
-              <a:t>10/12/2021</a:t>
+              <a:t>10/15/2021</a:t>
             </a:fld>
             <a:endParaRPr lang="LID4096"/>
           </a:p>
@@ -2935,7 +2935,7 @@
           <a:p>
             <a:fld id="{E43E6874-846B-4036-8D9A-9072E9C8BA6D}" type="datetimeFigureOut">
               <a:rPr lang="LID4096" smtClean="0"/>
-              <a:t>10/12/2021</a:t>
+              <a:t>10/15/2021</a:t>
             </a:fld>
             <a:endParaRPr lang="LID4096"/>
           </a:p>
@@ -4908,44 +4908,80 @@
             <a:custGeom>
               <a:avLst/>
               <a:gdLst>
-                <a:gd name="connsiteX0" fmla="*/ 0 w 2545894"/>
-                <a:gd name="connsiteY0" fmla="*/ 0 h 1950697"/>
-                <a:gd name="connsiteX1" fmla="*/ 560097 w 2545894"/>
-                <a:gd name="connsiteY1" fmla="*/ 0 h 1950697"/>
-                <a:gd name="connsiteX2" fmla="*/ 1069275 w 2545894"/>
-                <a:gd name="connsiteY2" fmla="*/ 0 h 1950697"/>
-                <a:gd name="connsiteX3" fmla="*/ 1603913 w 2545894"/>
-                <a:gd name="connsiteY3" fmla="*/ 0 h 1950697"/>
-                <a:gd name="connsiteX4" fmla="*/ 2036715 w 2545894"/>
-                <a:gd name="connsiteY4" fmla="*/ 0 h 1950697"/>
-                <a:gd name="connsiteX5" fmla="*/ 2545894 w 2545894"/>
-                <a:gd name="connsiteY5" fmla="*/ 0 h 1950697"/>
-                <a:gd name="connsiteX6" fmla="*/ 2545894 w 2545894"/>
-                <a:gd name="connsiteY6" fmla="*/ 448660 h 1950697"/>
-                <a:gd name="connsiteX7" fmla="*/ 2545894 w 2545894"/>
-                <a:gd name="connsiteY7" fmla="*/ 936335 h 1950697"/>
-                <a:gd name="connsiteX8" fmla="*/ 2545894 w 2545894"/>
-                <a:gd name="connsiteY8" fmla="*/ 1365488 h 1950697"/>
-                <a:gd name="connsiteX9" fmla="*/ 2545894 w 2545894"/>
-                <a:gd name="connsiteY9" fmla="*/ 1950697 h 1950697"/>
-                <a:gd name="connsiteX10" fmla="*/ 2036715 w 2545894"/>
-                <a:gd name="connsiteY10" fmla="*/ 1950697 h 1950697"/>
-                <a:gd name="connsiteX11" fmla="*/ 1603913 w 2545894"/>
-                <a:gd name="connsiteY11" fmla="*/ 1950697 h 1950697"/>
-                <a:gd name="connsiteX12" fmla="*/ 1145652 w 2545894"/>
-                <a:gd name="connsiteY12" fmla="*/ 1950697 h 1950697"/>
-                <a:gd name="connsiteX13" fmla="*/ 687391 w 2545894"/>
-                <a:gd name="connsiteY13" fmla="*/ 1950697 h 1950697"/>
-                <a:gd name="connsiteX14" fmla="*/ 0 w 2545894"/>
-                <a:gd name="connsiteY14" fmla="*/ 1950697 h 1950697"/>
-                <a:gd name="connsiteX15" fmla="*/ 0 w 2545894"/>
-                <a:gd name="connsiteY15" fmla="*/ 1424009 h 1950697"/>
-                <a:gd name="connsiteX16" fmla="*/ 0 w 2545894"/>
-                <a:gd name="connsiteY16" fmla="*/ 955842 h 1950697"/>
-                <a:gd name="connsiteX17" fmla="*/ 0 w 2545894"/>
-                <a:gd name="connsiteY17" fmla="*/ 507181 h 1950697"/>
-                <a:gd name="connsiteX18" fmla="*/ 0 w 2545894"/>
-                <a:gd name="connsiteY18" fmla="*/ 0 h 1950697"/>
+                <a:gd name="connsiteX0" fmla="*/ 0 w 5490796"/>
+                <a:gd name="connsiteY0" fmla="*/ 0 h 4207119"/>
+                <a:gd name="connsiteX1" fmla="*/ 658896 w 5490796"/>
+                <a:gd name="connsiteY1" fmla="*/ 0 h 4207119"/>
+                <a:gd name="connsiteX2" fmla="*/ 1207975 w 5490796"/>
+                <a:gd name="connsiteY2" fmla="*/ 0 h 4207119"/>
+                <a:gd name="connsiteX3" fmla="*/ 1811963 w 5490796"/>
+                <a:gd name="connsiteY3" fmla="*/ 0 h 4207119"/>
+                <a:gd name="connsiteX4" fmla="*/ 2196318 w 5490796"/>
+                <a:gd name="connsiteY4" fmla="*/ 0 h 4207119"/>
+                <a:gd name="connsiteX5" fmla="*/ 2690490 w 5490796"/>
+                <a:gd name="connsiteY5" fmla="*/ 0 h 4207119"/>
+                <a:gd name="connsiteX6" fmla="*/ 3129754 w 5490796"/>
+                <a:gd name="connsiteY6" fmla="*/ 0 h 4207119"/>
+                <a:gd name="connsiteX7" fmla="*/ 3733741 w 5490796"/>
+                <a:gd name="connsiteY7" fmla="*/ 0 h 4207119"/>
+                <a:gd name="connsiteX8" fmla="*/ 4392637 w 5490796"/>
+                <a:gd name="connsiteY8" fmla="*/ 0 h 4207119"/>
+                <a:gd name="connsiteX9" fmla="*/ 4886808 w 5490796"/>
+                <a:gd name="connsiteY9" fmla="*/ 0 h 4207119"/>
+                <a:gd name="connsiteX10" fmla="*/ 5490796 w 5490796"/>
+                <a:gd name="connsiteY10" fmla="*/ 0 h 4207119"/>
+                <a:gd name="connsiteX11" fmla="*/ 5490796 w 5490796"/>
+                <a:gd name="connsiteY11" fmla="*/ 525890 h 4207119"/>
+                <a:gd name="connsiteX12" fmla="*/ 5490796 w 5490796"/>
+                <a:gd name="connsiteY12" fmla="*/ 1051780 h 4207119"/>
+                <a:gd name="connsiteX13" fmla="*/ 5490796 w 5490796"/>
+                <a:gd name="connsiteY13" fmla="*/ 1661812 h 4207119"/>
+                <a:gd name="connsiteX14" fmla="*/ 5490796 w 5490796"/>
+                <a:gd name="connsiteY14" fmla="*/ 2271844 h 4207119"/>
+                <a:gd name="connsiteX15" fmla="*/ 5490796 w 5490796"/>
+                <a:gd name="connsiteY15" fmla="*/ 2881877 h 4207119"/>
+                <a:gd name="connsiteX16" fmla="*/ 5490796 w 5490796"/>
+                <a:gd name="connsiteY16" fmla="*/ 3491909 h 4207119"/>
+                <a:gd name="connsiteX17" fmla="*/ 5490796 w 5490796"/>
+                <a:gd name="connsiteY17" fmla="*/ 4207119 h 4207119"/>
+                <a:gd name="connsiteX18" fmla="*/ 4996624 w 5490796"/>
+                <a:gd name="connsiteY18" fmla="*/ 4207119 h 4207119"/>
+                <a:gd name="connsiteX19" fmla="*/ 4502453 w 5490796"/>
+                <a:gd name="connsiteY19" fmla="*/ 4207119 h 4207119"/>
+                <a:gd name="connsiteX20" fmla="*/ 3898465 w 5490796"/>
+                <a:gd name="connsiteY20" fmla="*/ 4207119 h 4207119"/>
+                <a:gd name="connsiteX21" fmla="*/ 3349386 w 5490796"/>
+                <a:gd name="connsiteY21" fmla="*/ 4207119 h 4207119"/>
+                <a:gd name="connsiteX22" fmla="*/ 2910122 w 5490796"/>
+                <a:gd name="connsiteY22" fmla="*/ 4207119 h 4207119"/>
+                <a:gd name="connsiteX23" fmla="*/ 2470858 w 5490796"/>
+                <a:gd name="connsiteY23" fmla="*/ 4207119 h 4207119"/>
+                <a:gd name="connsiteX24" fmla="*/ 2086502 w 5490796"/>
+                <a:gd name="connsiteY24" fmla="*/ 4207119 h 4207119"/>
+                <a:gd name="connsiteX25" fmla="*/ 1647239 w 5490796"/>
+                <a:gd name="connsiteY25" fmla="*/ 4207119 h 4207119"/>
+                <a:gd name="connsiteX26" fmla="*/ 1043251 w 5490796"/>
+                <a:gd name="connsiteY26" fmla="*/ 4207119 h 4207119"/>
+                <a:gd name="connsiteX27" fmla="*/ 603988 w 5490796"/>
+                <a:gd name="connsiteY27" fmla="*/ 4207119 h 4207119"/>
+                <a:gd name="connsiteX28" fmla="*/ 0 w 5490796"/>
+                <a:gd name="connsiteY28" fmla="*/ 4207119 h 4207119"/>
+                <a:gd name="connsiteX29" fmla="*/ 0 w 5490796"/>
+                <a:gd name="connsiteY29" fmla="*/ 3597087 h 4207119"/>
+                <a:gd name="connsiteX30" fmla="*/ 0 w 5490796"/>
+                <a:gd name="connsiteY30" fmla="*/ 3071197 h 4207119"/>
+                <a:gd name="connsiteX31" fmla="*/ 0 w 5490796"/>
+                <a:gd name="connsiteY31" fmla="*/ 2629449 h 4207119"/>
+                <a:gd name="connsiteX32" fmla="*/ 0 w 5490796"/>
+                <a:gd name="connsiteY32" fmla="*/ 2145631 h 4207119"/>
+                <a:gd name="connsiteX33" fmla="*/ 0 w 5490796"/>
+                <a:gd name="connsiteY33" fmla="*/ 1535598 h 4207119"/>
+                <a:gd name="connsiteX34" fmla="*/ 0 w 5490796"/>
+                <a:gd name="connsiteY34" fmla="*/ 1135922 h 4207119"/>
+                <a:gd name="connsiteX35" fmla="*/ 0 w 5490796"/>
+                <a:gd name="connsiteY35" fmla="*/ 736246 h 4207119"/>
+                <a:gd name="connsiteX36" fmla="*/ 0 w 5490796"/>
+                <a:gd name="connsiteY36" fmla="*/ 0 h 4207119"/>
               </a:gdLst>
               <a:ahLst/>
               <a:cxnLst>
@@ -5006,101 +5042,245 @@
                 <a:cxn ang="0">
                   <a:pos x="connsiteX18" y="connsiteY18"/>
                 </a:cxn>
+                <a:cxn ang="0">
+                  <a:pos x="connsiteX19" y="connsiteY19"/>
+                </a:cxn>
+                <a:cxn ang="0">
+                  <a:pos x="connsiteX20" y="connsiteY20"/>
+                </a:cxn>
+                <a:cxn ang="0">
+                  <a:pos x="connsiteX21" y="connsiteY21"/>
+                </a:cxn>
+                <a:cxn ang="0">
+                  <a:pos x="connsiteX22" y="connsiteY22"/>
+                </a:cxn>
+                <a:cxn ang="0">
+                  <a:pos x="connsiteX23" y="connsiteY23"/>
+                </a:cxn>
+                <a:cxn ang="0">
+                  <a:pos x="connsiteX24" y="connsiteY24"/>
+                </a:cxn>
+                <a:cxn ang="0">
+                  <a:pos x="connsiteX25" y="connsiteY25"/>
+                </a:cxn>
+                <a:cxn ang="0">
+                  <a:pos x="connsiteX26" y="connsiteY26"/>
+                </a:cxn>
+                <a:cxn ang="0">
+                  <a:pos x="connsiteX27" y="connsiteY27"/>
+                </a:cxn>
+                <a:cxn ang="0">
+                  <a:pos x="connsiteX28" y="connsiteY28"/>
+                </a:cxn>
+                <a:cxn ang="0">
+                  <a:pos x="connsiteX29" y="connsiteY29"/>
+                </a:cxn>
+                <a:cxn ang="0">
+                  <a:pos x="connsiteX30" y="connsiteY30"/>
+                </a:cxn>
+                <a:cxn ang="0">
+                  <a:pos x="connsiteX31" y="connsiteY31"/>
+                </a:cxn>
+                <a:cxn ang="0">
+                  <a:pos x="connsiteX32" y="connsiteY32"/>
+                </a:cxn>
+                <a:cxn ang="0">
+                  <a:pos x="connsiteX33" y="connsiteY33"/>
+                </a:cxn>
+                <a:cxn ang="0">
+                  <a:pos x="connsiteX34" y="connsiteY34"/>
+                </a:cxn>
+                <a:cxn ang="0">
+                  <a:pos x="connsiteX35" y="connsiteY35"/>
+                </a:cxn>
+                <a:cxn ang="0">
+                  <a:pos x="connsiteX36" y="connsiteY36"/>
+                </a:cxn>
               </a:cxnLst>
               <a:rect l="l" t="t" r="r" b="b"/>
               <a:pathLst>
-                <a:path w="2545894" h="1950697" extrusionOk="0">
+                <a:path w="5490796" h="4207119" extrusionOk="0">
                   <a:moveTo>
                     <a:pt x="0" y="0"/>
                   </a:moveTo>
                   <a:cubicBezTo>
-                    <a:pt x="155582" y="-9459"/>
-                    <a:pt x="283686" y="27222"/>
-                    <a:pt x="560097" y="0"/>
+                    <a:pt x="320577" y="-55145"/>
+                    <a:pt x="426710" y="43927"/>
+                    <a:pt x="658896" y="0"/>
                   </a:cubicBezTo>
                   <a:cubicBezTo>
-                    <a:pt x="836508" y="-27222"/>
-                    <a:pt x="883551" y="19815"/>
-                    <a:pt x="1069275" y="0"/>
+                    <a:pt x="891082" y="-43927"/>
+                    <a:pt x="1042891" y="35243"/>
+                    <a:pt x="1207975" y="0"/>
                   </a:cubicBezTo>
                   <a:cubicBezTo>
-                    <a:pt x="1254999" y="-19815"/>
-                    <a:pt x="1342780" y="7288"/>
-                    <a:pt x="1603913" y="0"/>
+                    <a:pt x="1373059" y="-35243"/>
+                    <a:pt x="1570740" y="43283"/>
+                    <a:pt x="1811963" y="0"/>
                   </a:cubicBezTo>
                   <a:cubicBezTo>
-                    <a:pt x="1865046" y="-7288"/>
-                    <a:pt x="1867550" y="20176"/>
-                    <a:pt x="2036715" y="0"/>
+                    <a:pt x="2053186" y="-43283"/>
+                    <a:pt x="2017486" y="8553"/>
+                    <a:pt x="2196318" y="0"/>
                   </a:cubicBezTo>
                   <a:cubicBezTo>
-                    <a:pt x="2205880" y="-20176"/>
-                    <a:pt x="2391831" y="28974"/>
-                    <a:pt x="2545894" y="0"/>
+                    <a:pt x="2375150" y="-8553"/>
+                    <a:pt x="2475306" y="38757"/>
+                    <a:pt x="2690490" y="0"/>
                   </a:cubicBezTo>
                   <a:cubicBezTo>
-                    <a:pt x="2597215" y="116267"/>
-                    <a:pt x="2545750" y="237293"/>
-                    <a:pt x="2545894" y="448660"/>
+                    <a:pt x="2905674" y="-38757"/>
+                    <a:pt x="2915451" y="15881"/>
+                    <a:pt x="3129754" y="0"/>
                   </a:cubicBezTo>
                   <a:cubicBezTo>
-                    <a:pt x="2546038" y="660027"/>
-                    <a:pt x="2495285" y="834614"/>
-                    <a:pt x="2545894" y="936335"/>
+                    <a:pt x="3344057" y="-15881"/>
+                    <a:pt x="3437909" y="55238"/>
+                    <a:pt x="3733741" y="0"/>
                   </a:cubicBezTo>
                   <a:cubicBezTo>
-                    <a:pt x="2596503" y="1038056"/>
-                    <a:pt x="2507552" y="1179480"/>
-                    <a:pt x="2545894" y="1365488"/>
+                    <a:pt x="4029573" y="-55238"/>
+                    <a:pt x="4237437" y="12811"/>
+                    <a:pt x="4392637" y="0"/>
                   </a:cubicBezTo>
                   <a:cubicBezTo>
-                    <a:pt x="2584236" y="1551496"/>
-                    <a:pt x="2525214" y="1775578"/>
-                    <a:pt x="2545894" y="1950697"/>
+                    <a:pt x="4547837" y="-12811"/>
+                    <a:pt x="4658562" y="37211"/>
+                    <a:pt x="4886808" y="0"/>
                   </a:cubicBezTo>
                   <a:cubicBezTo>
-                    <a:pt x="2377922" y="1996357"/>
-                    <a:pt x="2170956" y="1928794"/>
-                    <a:pt x="2036715" y="1950697"/>
+                    <a:pt x="5115054" y="-37211"/>
+                    <a:pt x="5310598" y="41715"/>
+                    <a:pt x="5490796" y="0"/>
                   </a:cubicBezTo>
                   <a:cubicBezTo>
-                    <a:pt x="1902474" y="1972600"/>
-                    <a:pt x="1792714" y="1928564"/>
-                    <a:pt x="1603913" y="1950697"/>
+                    <a:pt x="5512982" y="190231"/>
+                    <a:pt x="5480619" y="417025"/>
+                    <a:pt x="5490796" y="525890"/>
                   </a:cubicBezTo>
                   <a:cubicBezTo>
-                    <a:pt x="1415112" y="1972830"/>
-                    <a:pt x="1333554" y="1923827"/>
-                    <a:pt x="1145652" y="1950697"/>
+                    <a:pt x="5500973" y="634755"/>
+                    <a:pt x="5448127" y="805333"/>
+                    <a:pt x="5490796" y="1051780"/>
                   </a:cubicBezTo>
                   <a:cubicBezTo>
-                    <a:pt x="957750" y="1977567"/>
-                    <a:pt x="896191" y="1921114"/>
-                    <a:pt x="687391" y="1950697"/>
+                    <a:pt x="5533465" y="1298227"/>
+                    <a:pt x="5489565" y="1407370"/>
+                    <a:pt x="5490796" y="1661812"/>
                   </a:cubicBezTo>
                   <a:cubicBezTo>
-                    <a:pt x="478591" y="1980280"/>
-                    <a:pt x="284740" y="1941749"/>
-                    <a:pt x="0" y="1950697"/>
+                    <a:pt x="5492027" y="1916254"/>
+                    <a:pt x="5455879" y="2016420"/>
+                    <a:pt x="5490796" y="2271844"/>
                   </a:cubicBezTo>
                   <a:cubicBezTo>
-                    <a:pt x="-13804" y="1728582"/>
-                    <a:pt x="22729" y="1663037"/>
-                    <a:pt x="0" y="1424009"/>
+                    <a:pt x="5525713" y="2527268"/>
+                    <a:pt x="5431097" y="2586116"/>
+                    <a:pt x="5490796" y="2881877"/>
                   </a:cubicBezTo>
                   <a:cubicBezTo>
-                    <a:pt x="-22729" y="1184981"/>
-                    <a:pt x="40330" y="1056345"/>
-                    <a:pt x="0" y="955842"/>
+                    <a:pt x="5550495" y="3177638"/>
+                    <a:pt x="5490040" y="3208710"/>
+                    <a:pt x="5490796" y="3491909"/>
                   </a:cubicBezTo>
                   <a:cubicBezTo>
-                    <a:pt x="-40330" y="855339"/>
-                    <a:pt x="34145" y="705793"/>
-                    <a:pt x="0" y="507181"/>
+                    <a:pt x="5491552" y="3775108"/>
+                    <a:pt x="5418258" y="3885154"/>
+                    <a:pt x="5490796" y="4207119"/>
                   </a:cubicBezTo>
                   <a:cubicBezTo>
-                    <a:pt x="-34145" y="308569"/>
-                    <a:pt x="7806" y="222865"/>
+                    <a:pt x="5317407" y="4225495"/>
+                    <a:pt x="5119222" y="4180937"/>
+                    <a:pt x="4996624" y="4207119"/>
+                  </a:cubicBezTo>
+                  <a:cubicBezTo>
+                    <a:pt x="4874026" y="4233301"/>
+                    <a:pt x="4624928" y="4170447"/>
+                    <a:pt x="4502453" y="4207119"/>
+                  </a:cubicBezTo>
+                  <a:cubicBezTo>
+                    <a:pt x="4379978" y="4243791"/>
+                    <a:pt x="4104289" y="4136456"/>
+                    <a:pt x="3898465" y="4207119"/>
+                  </a:cubicBezTo>
+                  <a:cubicBezTo>
+                    <a:pt x="3692641" y="4277782"/>
+                    <a:pt x="3612264" y="4172390"/>
+                    <a:pt x="3349386" y="4207119"/>
+                  </a:cubicBezTo>
+                  <a:cubicBezTo>
+                    <a:pt x="3086508" y="4241848"/>
+                    <a:pt x="3098581" y="4202847"/>
+                    <a:pt x="2910122" y="4207119"/>
+                  </a:cubicBezTo>
+                  <a:cubicBezTo>
+                    <a:pt x="2721663" y="4211391"/>
+                    <a:pt x="2676443" y="4172226"/>
+                    <a:pt x="2470858" y="4207119"/>
+                  </a:cubicBezTo>
+                  <a:cubicBezTo>
+                    <a:pt x="2265273" y="4242012"/>
+                    <a:pt x="2217568" y="4194738"/>
+                    <a:pt x="2086502" y="4207119"/>
+                  </a:cubicBezTo>
+                  <a:cubicBezTo>
+                    <a:pt x="1955436" y="4219500"/>
+                    <a:pt x="1865897" y="4171018"/>
+                    <a:pt x="1647239" y="4207119"/>
+                  </a:cubicBezTo>
+                  <a:cubicBezTo>
+                    <a:pt x="1428581" y="4243220"/>
+                    <a:pt x="1314397" y="4153293"/>
+                    <a:pt x="1043251" y="4207119"/>
+                  </a:cubicBezTo>
+                  <a:cubicBezTo>
+                    <a:pt x="772105" y="4260945"/>
+                    <a:pt x="789967" y="4185641"/>
+                    <a:pt x="603988" y="4207119"/>
+                  </a:cubicBezTo>
+                  <a:cubicBezTo>
+                    <a:pt x="418009" y="4228597"/>
+                    <a:pt x="211045" y="4159374"/>
+                    <a:pt x="0" y="4207119"/>
+                  </a:cubicBezTo>
+                  <a:cubicBezTo>
+                    <a:pt x="-60408" y="4021005"/>
+                    <a:pt x="38565" y="3856430"/>
+                    <a:pt x="0" y="3597087"/>
+                  </a:cubicBezTo>
+                  <a:cubicBezTo>
+                    <a:pt x="-38565" y="3337744"/>
+                    <a:pt x="4453" y="3313734"/>
+                    <a:pt x="0" y="3071197"/>
+                  </a:cubicBezTo>
+                  <a:cubicBezTo>
+                    <a:pt x="-4453" y="2828660"/>
+                    <a:pt x="21054" y="2813672"/>
+                    <a:pt x="0" y="2629449"/>
+                  </a:cubicBezTo>
+                  <a:cubicBezTo>
+                    <a:pt x="-21054" y="2445226"/>
+                    <a:pt x="30647" y="2300642"/>
+                    <a:pt x="0" y="2145631"/>
+                  </a:cubicBezTo>
+                  <a:cubicBezTo>
+                    <a:pt x="-30647" y="1990620"/>
+                    <a:pt x="25308" y="1670408"/>
+                    <a:pt x="0" y="1535598"/>
+                  </a:cubicBezTo>
+                  <a:cubicBezTo>
+                    <a:pt x="-25308" y="1400788"/>
+                    <a:pt x="46451" y="1263269"/>
+                    <a:pt x="0" y="1135922"/>
+                  </a:cubicBezTo>
+                  <a:cubicBezTo>
+                    <a:pt x="-46451" y="1008575"/>
+                    <a:pt x="12805" y="898578"/>
+                    <a:pt x="0" y="736246"/>
+                  </a:cubicBezTo>
+                  <a:cubicBezTo>
+                    <a:pt x="-12805" y="573914"/>
+                    <a:pt x="18714" y="178020"/>
                     <a:pt x="0" y="0"/>
                   </a:cubicBezTo>
                   <a:close/>
@@ -6952,7 +7132,7 @@
         </p:nvGrpSpPr>
         <p:grpSpPr>
           <a:xfrm>
-            <a:off x="796156" y="783970"/>
+            <a:off x="659522" y="778715"/>
             <a:ext cx="10387659" cy="5493737"/>
             <a:chOff x="796156" y="783970"/>
             <a:chExt cx="10387659" cy="5493737"/>
@@ -8257,7 +8437,7 @@
           </p:nvSpPr>
           <p:spPr>
             <a:xfrm>
-              <a:off x="6287524" y="5550546"/>
+              <a:off x="5570527" y="5564769"/>
               <a:ext cx="1433994" cy="514838"/>
             </a:xfrm>
             <a:prstGeom prst="can">
@@ -8310,9 +8490,9 @@
             <p:nvPr/>
           </p:nvCxnSpPr>
           <p:spPr>
-            <a:xfrm rot="16200000" flipH="1">
-              <a:off x="6545887" y="5091911"/>
-              <a:ext cx="475309" cy="441960"/>
+            <a:xfrm rot="5400000">
+              <a:off x="6180277" y="5182485"/>
+              <a:ext cx="489532" cy="275037"/>
             </a:xfrm>
             <a:prstGeom prst="bentConnector3">
               <a:avLst>
@@ -8673,6 +8853,101 @@
           </p:txBody>
         </p:sp>
       </p:grpSp>
+      <p:sp>
+        <p:nvSpPr>
+          <p:cNvPr id="10" name="Cylinder 9">
+            <a:extLst>
+              <a:ext uri="{FF2B5EF4-FFF2-40B4-BE49-F238E27FC236}">
+                <a16:creationId xmlns:a16="http://schemas.microsoft.com/office/drawing/2014/main" id="{9F72BB08-249C-4E6C-A940-2031128C42CD}"/>
+              </a:ext>
+            </a:extLst>
+          </p:cNvPr>
+          <p:cNvSpPr/>
+          <p:nvPr/>
+        </p:nvSpPr>
+        <p:spPr>
+          <a:xfrm>
+            <a:off x="7651401" y="5558638"/>
+            <a:ext cx="673062" cy="514838"/>
+          </a:xfrm>
+          <a:prstGeom prst="can">
+            <a:avLst>
+              <a:gd name="adj" fmla="val 28062"/>
+            </a:avLst>
+          </a:prstGeom>
+        </p:spPr>
+        <p:style>
+          <a:lnRef idx="2">
+            <a:schemeClr val="accent1">
+              <a:shade val="50000"/>
+            </a:schemeClr>
+          </a:lnRef>
+          <a:fillRef idx="1">
+            <a:schemeClr val="accent1"/>
+          </a:fillRef>
+          <a:effectRef idx="0">
+            <a:schemeClr val="accent1"/>
+          </a:effectRef>
+          <a:fontRef idx="minor">
+            <a:schemeClr val="lt1"/>
+          </a:fontRef>
+        </p:style>
+        <p:txBody>
+          <a:bodyPr vert="horz" rtlCol="0" anchor="ctr"/>
+          <a:lstStyle/>
+          <a:p>
+            <a:pPr algn="ctr"/>
+            <a:r>
+              <a:rPr lang="de-DE" dirty="0"/>
+              <a:t>DB</a:t>
+            </a:r>
+            <a:endParaRPr lang="LID4096" dirty="0"/>
+          </a:p>
+        </p:txBody>
+      </p:sp>
+      <p:cxnSp>
+        <p:nvCxnSpPr>
+          <p:cNvPr id="12" name="Straight Arrow Connector 11">
+            <a:extLst>
+              <a:ext uri="{FF2B5EF4-FFF2-40B4-BE49-F238E27FC236}">
+                <a16:creationId xmlns:a16="http://schemas.microsoft.com/office/drawing/2014/main" id="{FDE01215-4E11-4283-9DCD-2F1ABFD5A2ED}"/>
+              </a:ext>
+            </a:extLst>
+          </p:cNvPr>
+          <p:cNvCxnSpPr>
+            <a:cxnSpLocks/>
+            <a:stCxn id="38" idx="2"/>
+            <a:endCxn id="10" idx="1"/>
+          </p:cNvCxnSpPr>
+          <p:nvPr/>
+        </p:nvCxnSpPr>
+        <p:spPr>
+          <a:xfrm>
+            <a:off x="7775714" y="4084519"/>
+            <a:ext cx="212218" cy="1474119"/>
+          </a:xfrm>
+          <a:prstGeom prst="straightConnector1">
+            <a:avLst/>
+          </a:prstGeom>
+          <a:ln w="28575">
+            <a:tailEnd type="triangle"/>
+          </a:ln>
+        </p:spPr>
+        <p:style>
+          <a:lnRef idx="1">
+            <a:schemeClr val="dk1"/>
+          </a:lnRef>
+          <a:fillRef idx="0">
+            <a:schemeClr val="dk1"/>
+          </a:fillRef>
+          <a:effectRef idx="0">
+            <a:schemeClr val="dk1"/>
+          </a:effectRef>
+          <a:fontRef idx="minor">
+            <a:schemeClr val="tx1"/>
+          </a:fontRef>
+        </p:style>
+      </p:cxnSp>
     </p:spTree>
     <p:extLst>
       <p:ext uri="{BB962C8B-B14F-4D97-AF65-F5344CB8AC3E}">

</xml_diff>

<commit_message>
.NET 6 and othes stuff
</commit_message>
<xml_diff>
--- a/docs/images.pptx
+++ b/docs/images.pptx
@@ -267,7 +267,7 @@
           <a:p>
             <a:fld id="{E43E6874-846B-4036-8D9A-9072E9C8BA6D}" type="datetimeFigureOut">
               <a:rPr lang="LID4096" smtClean="0"/>
-              <a:t>10/18/2021</a:t>
+              <a:t>11/04/2021</a:t>
             </a:fld>
             <a:endParaRPr lang="LID4096"/>
           </a:p>
@@ -467,7 +467,7 @@
           <a:p>
             <a:fld id="{E43E6874-846B-4036-8D9A-9072E9C8BA6D}" type="datetimeFigureOut">
               <a:rPr lang="LID4096" smtClean="0"/>
-              <a:t>10/18/2021</a:t>
+              <a:t>11/04/2021</a:t>
             </a:fld>
             <a:endParaRPr lang="LID4096"/>
           </a:p>
@@ -677,7 +677,7 @@
           <a:p>
             <a:fld id="{E43E6874-846B-4036-8D9A-9072E9C8BA6D}" type="datetimeFigureOut">
               <a:rPr lang="LID4096" smtClean="0"/>
-              <a:t>10/18/2021</a:t>
+              <a:t>11/04/2021</a:t>
             </a:fld>
             <a:endParaRPr lang="LID4096"/>
           </a:p>
@@ -877,7 +877,7 @@
           <a:p>
             <a:fld id="{E43E6874-846B-4036-8D9A-9072E9C8BA6D}" type="datetimeFigureOut">
               <a:rPr lang="LID4096" smtClean="0"/>
-              <a:t>10/18/2021</a:t>
+              <a:t>11/04/2021</a:t>
             </a:fld>
             <a:endParaRPr lang="LID4096"/>
           </a:p>
@@ -1153,7 +1153,7 @@
           <a:p>
             <a:fld id="{E43E6874-846B-4036-8D9A-9072E9C8BA6D}" type="datetimeFigureOut">
               <a:rPr lang="LID4096" smtClean="0"/>
-              <a:t>10/18/2021</a:t>
+              <a:t>11/04/2021</a:t>
             </a:fld>
             <a:endParaRPr lang="LID4096"/>
           </a:p>
@@ -1421,7 +1421,7 @@
           <a:p>
             <a:fld id="{E43E6874-846B-4036-8D9A-9072E9C8BA6D}" type="datetimeFigureOut">
               <a:rPr lang="LID4096" smtClean="0"/>
-              <a:t>10/18/2021</a:t>
+              <a:t>11/04/2021</a:t>
             </a:fld>
             <a:endParaRPr lang="LID4096"/>
           </a:p>
@@ -1836,7 +1836,7 @@
           <a:p>
             <a:fld id="{E43E6874-846B-4036-8D9A-9072E9C8BA6D}" type="datetimeFigureOut">
               <a:rPr lang="LID4096" smtClean="0"/>
-              <a:t>10/18/2021</a:t>
+              <a:t>11/04/2021</a:t>
             </a:fld>
             <a:endParaRPr lang="LID4096"/>
           </a:p>
@@ -1978,7 +1978,7 @@
           <a:p>
             <a:fld id="{E43E6874-846B-4036-8D9A-9072E9C8BA6D}" type="datetimeFigureOut">
               <a:rPr lang="LID4096" smtClean="0"/>
-              <a:t>10/18/2021</a:t>
+              <a:t>11/04/2021</a:t>
             </a:fld>
             <a:endParaRPr lang="LID4096"/>
           </a:p>
@@ -2091,7 +2091,7 @@
           <a:p>
             <a:fld id="{E43E6874-846B-4036-8D9A-9072E9C8BA6D}" type="datetimeFigureOut">
               <a:rPr lang="LID4096" smtClean="0"/>
-              <a:t>10/18/2021</a:t>
+              <a:t>11/04/2021</a:t>
             </a:fld>
             <a:endParaRPr lang="LID4096"/>
           </a:p>
@@ -2404,7 +2404,7 @@
           <a:p>
             <a:fld id="{E43E6874-846B-4036-8D9A-9072E9C8BA6D}" type="datetimeFigureOut">
               <a:rPr lang="LID4096" smtClean="0"/>
-              <a:t>10/18/2021</a:t>
+              <a:t>11/04/2021</a:t>
             </a:fld>
             <a:endParaRPr lang="LID4096"/>
           </a:p>
@@ -2693,7 +2693,7 @@
           <a:p>
             <a:fld id="{E43E6874-846B-4036-8D9A-9072E9C8BA6D}" type="datetimeFigureOut">
               <a:rPr lang="LID4096" smtClean="0"/>
-              <a:t>10/18/2021</a:t>
+              <a:t>11/04/2021</a:t>
             </a:fld>
             <a:endParaRPr lang="LID4096"/>
           </a:p>
@@ -2936,7 +2936,7 @@
           <a:p>
             <a:fld id="{E43E6874-846B-4036-8D9A-9072E9C8BA6D}" type="datetimeFigureOut">
               <a:rPr lang="LID4096" smtClean="0"/>
-              <a:t>10/18/2021</a:t>
+              <a:t>11/04/2021</a:t>
             </a:fld>
             <a:endParaRPr lang="LID4096"/>
           </a:p>
@@ -12328,7 +12328,7 @@
           <a:prstGeom prst="straightConnector1">
             <a:avLst/>
           </a:prstGeom>
-          <a:ln w="28575">
+          <a:ln w="76200">
             <a:tailEnd type="triangle"/>
           </a:ln>
         </p:spPr>
@@ -12559,6 +12559,151 @@
               <a:rPr lang="en-US" sz="900" dirty="0"/>
               <a:t>Load latest snapshot on startup</a:t>
             </a:r>
+          </a:p>
+        </p:txBody>
+      </p:sp>
+      <p:sp>
+        <p:nvSpPr>
+          <p:cNvPr id="2" name="TextBox 1">
+            <a:extLst>
+              <a:ext uri="{FF2B5EF4-FFF2-40B4-BE49-F238E27FC236}">
+                <a16:creationId xmlns:a16="http://schemas.microsoft.com/office/drawing/2014/main" id="{DC32BD6B-DCDC-4E26-B470-2549AB0C1195}"/>
+              </a:ext>
+            </a:extLst>
+          </p:cNvPr>
+          <p:cNvSpPr txBox="1"/>
+          <p:nvPr/>
+        </p:nvSpPr>
+        <p:spPr>
+          <a:xfrm>
+            <a:off x="7329418" y="1181328"/>
+            <a:ext cx="4848700" cy="646331"/>
+          </a:xfrm>
+          <a:prstGeom prst="rect">
+            <a:avLst/>
+          </a:prstGeom>
+          <a:noFill/>
+        </p:spPr>
+        <p:txBody>
+          <a:bodyPr wrap="none" rtlCol="0">
+            <a:spAutoFit/>
+          </a:bodyPr>
+          <a:lstStyle/>
+          <a:p>
+            <a:r>
+              <a:rPr lang="de-DE" dirty="0" err="1"/>
+              <a:t>resourceID</a:t>
+            </a:r>
+            <a:r>
+              <a:rPr lang="de-DE" dirty="0"/>
+              <a:t> = </a:t>
+            </a:r>
+            <a:r>
+              <a:rPr lang="en-US" sz="1800" dirty="0"/>
+              <a:t>123748123407  (for SaaS)</a:t>
+            </a:r>
+            <a:endParaRPr lang="de-DE" dirty="0"/>
+          </a:p>
+          <a:p>
+            <a:r>
+              <a:rPr lang="de-DE" dirty="0" err="1"/>
+              <a:t>resourceID</a:t>
+            </a:r>
+            <a:r>
+              <a:rPr lang="de-DE" dirty="0"/>
+              <a:t> = /</a:t>
+            </a:r>
+            <a:r>
+              <a:rPr lang="de-DE" dirty="0" err="1"/>
+              <a:t>subscription</a:t>
+            </a:r>
+            <a:r>
+              <a:rPr lang="de-DE" dirty="0"/>
+              <a:t>/1234/</a:t>
+            </a:r>
+            <a:r>
+              <a:rPr lang="de-DE" dirty="0" err="1"/>
+              <a:t>resourceGroub</a:t>
+            </a:r>
+            <a:r>
+              <a:rPr lang="de-DE" dirty="0"/>
+              <a:t>/i</a:t>
+            </a:r>
+            <a:endParaRPr lang="LID4096" dirty="0"/>
+          </a:p>
+        </p:txBody>
+      </p:sp>
+      <p:sp>
+        <p:nvSpPr>
+          <p:cNvPr id="3" name="Speech Bubble: Rectangle 2">
+            <a:extLst>
+              <a:ext uri="{FF2B5EF4-FFF2-40B4-BE49-F238E27FC236}">
+                <a16:creationId xmlns:a16="http://schemas.microsoft.com/office/drawing/2014/main" id="{0458429A-EE30-407A-8684-36403909A529}"/>
+              </a:ext>
+            </a:extLst>
+          </p:cNvPr>
+          <p:cNvSpPr/>
+          <p:nvPr/>
+        </p:nvSpPr>
+        <p:spPr>
+          <a:xfrm>
+            <a:off x="1145063" y="1680999"/>
+            <a:ext cx="1803636" cy="582246"/>
+          </a:xfrm>
+          <a:prstGeom prst="wedgeRectCallout">
+            <a:avLst>
+              <a:gd name="adj1" fmla="val 60607"/>
+              <a:gd name="adj2" fmla="val 458348"/>
+            </a:avLst>
+          </a:prstGeom>
+          <a:solidFill>
+            <a:schemeClr val="bg1">
+              <a:lumMod val="85000"/>
+            </a:schemeClr>
+          </a:solidFill>
+          <a:ln>
+            <a:noFill/>
+          </a:ln>
+        </p:spPr>
+        <p:style>
+          <a:lnRef idx="2">
+            <a:schemeClr val="dk1"/>
+          </a:lnRef>
+          <a:fillRef idx="1">
+            <a:schemeClr val="lt1"/>
+          </a:fillRef>
+          <a:effectRef idx="0">
+            <a:schemeClr val="dk1"/>
+          </a:effectRef>
+          <a:fontRef idx="minor">
+            <a:schemeClr val="dk1"/>
+          </a:fontRef>
+        </p:style>
+        <p:txBody>
+          <a:bodyPr rtlCol="0" anchor="t"/>
+          <a:lstStyle/>
+          <a:p>
+            <a:r>
+              <a:rPr lang="en-US" sz="900" dirty="0"/>
+              <a:t>Scope = “123748123407”</a:t>
+            </a:r>
+          </a:p>
+          <a:p>
+            <a:r>
+              <a:rPr lang="en-US" sz="900" dirty="0"/>
+              <a:t>Scope = “</a:t>
+            </a:r>
+            <a:r>
+              <a:rPr lang="en-US" sz="900" dirty="0" err="1"/>
+              <a:t>AzureManagedApp</a:t>
+            </a:r>
+            <a:r>
+              <a:rPr lang="en-US" sz="900" dirty="0"/>
+              <a:t>”</a:t>
+            </a:r>
+          </a:p>
+          <a:p>
+            <a:endParaRPr lang="en-US" sz="900" dirty="0"/>
           </a:p>
         </p:txBody>
       </p:sp>

</xml_diff>